<commit_message>
Updating Brochage/Procedure Robot Holonome
</commit_message>
<xml_diff>
--- a/Maquettes/Elec_Num_Emb/Robot_Holonome/brochages.pptx
+++ b/Maquettes/Elec_Num_Emb/Robot_Holonome/brochages.pptx
@@ -480,7 +480,7 @@
         <p:spPr>
           <a:xfrm>
             <a:off x="685800" y="1143000"/>
-            <a:ext cx="5485680" cy="3085560"/>
+            <a:ext cx="5486400" cy="3086100"/>
           </a:xfrm>
           <a:prstGeom prst="rect">
             <a:avLst/>
@@ -3192,64 +3192,6 @@
       </p:sp>
       <p:sp>
         <p:nvSpPr>
-          <p:cNvPr id="55" name="CustomShape 8"/>
-          <p:cNvSpPr/>
-          <p:nvPr/>
-        </p:nvSpPr>
-        <p:spPr>
-          <a:xfrm rot="20541600">
-            <a:off x="1380960" y="3630960"/>
-            <a:ext cx="9173160" cy="1095120"/>
-          </a:xfrm>
-          <a:prstGeom prst="rect">
-            <a:avLst/>
-          </a:prstGeom>
-          <a:noFill/>
-          <a:ln w="0">
-            <a:noFill/>
-          </a:ln>
-        </p:spPr>
-        <p:style>
-          <a:lnRef idx="0">
-            <a:scrgbClr r="0" g="0" b="0"/>
-          </a:lnRef>
-          <a:fillRef idx="0">
-            <a:scrgbClr r="0" g="0" b="0"/>
-          </a:fillRef>
-          <a:effectRef idx="0">
-            <a:scrgbClr r="0" g="0" b="0"/>
-          </a:effectRef>
-          <a:fontRef idx="minor"/>
-        </p:style>
-        <p:txBody>
-          <a:bodyPr lIns="90000" tIns="45000" rIns="90000" bIns="45000">
-            <a:spAutoFit/>
-          </a:bodyPr>
-          <a:lstStyle/>
-          <a:p>
-            <a:pPr>
-              <a:lnSpc>
-                <a:spcPct val="100000"/>
-              </a:lnSpc>
-            </a:pPr>
-            <a:r>
-              <a:rPr lang="fr-FR" sz="6600" b="0" strike="noStrike" spc="-1">
-                <a:solidFill>
-                  <a:srgbClr val="BFBFBF"/>
-                </a:solidFill>
-                <a:latin typeface="Calibri"/>
-                <a:ea typeface="DejaVu Sans"/>
-              </a:rPr>
-              <a:t>APPROBATION EN COURS</a:t>
-            </a:r>
-            <a:endParaRPr lang="fr-FR" sz="6600" b="0" strike="noStrike" spc="-1">
-              <a:latin typeface="Arial"/>
-            </a:endParaRPr>
-          </a:p>
-        </p:txBody>
-      </p:sp>
-      <p:sp>
-        <p:nvSpPr>
           <p:cNvPr id="56" name="CustomShape 9"/>
           <p:cNvSpPr/>
           <p:nvPr/>
@@ -3551,14 +3493,6 @@
   <p:clrMapOvr>
     <a:masterClrMapping/>
   </p:clrMapOvr>
-  <mc:AlternateContent xmlns:mc="http://schemas.openxmlformats.org/markup-compatibility/2006" xmlns:p14="http://schemas.microsoft.com/office/powerpoint/2010/main">
-    <mc:Choice Requires="p14">
-      <p:transition spd="slow" p14:dur="2000"/>
-    </mc:Choice>
-    <mc:Fallback xmlns="" xmlns:p15="http://schemas.microsoft.com/office/powerpoint/2012/main">
-      <p:transition spd="slow"/>
-    </mc:Fallback>
-  </mc:AlternateContent>
 </p:sld>
 </file>
 
@@ -7093,14 +7027,6 @@
   <p:clrMapOvr>
     <a:masterClrMapping/>
   </p:clrMapOvr>
-  <mc:AlternateContent xmlns:mc="http://schemas.openxmlformats.org/markup-compatibility/2006" xmlns:p14="http://schemas.microsoft.com/office/powerpoint/2010/main">
-    <mc:Choice Requires="p14">
-      <p:transition spd="slow" p14:dur="2000"/>
-    </mc:Choice>
-    <mc:Fallback xmlns="" xmlns:p15="http://schemas.microsoft.com/office/powerpoint/2012/main">
-      <p:transition spd="slow"/>
-    </mc:Fallback>
-  </mc:AlternateContent>
 </p:sld>
 </file>
 
@@ -7328,133 +7254,71 @@
       </p:pic>
       <p:sp>
         <p:nvSpPr>
-          <p:cNvPr id="119" name="CustomShape 5"/>
-          <p:cNvSpPr/>
-          <p:nvPr/>
-        </p:nvSpPr>
-        <p:spPr>
-          <a:xfrm rot="5400000">
-            <a:off x="8161560" y="267480"/>
-            <a:ext cx="385920" cy="3788640"/>
-          </a:xfrm>
-          <a:prstGeom prst="roundRect">
-            <a:avLst>
-              <a:gd name="adj" fmla="val 16667"/>
-            </a:avLst>
-          </a:prstGeom>
-          <a:solidFill>
-            <a:schemeClr val="bg1"/>
-          </a:solidFill>
-          <a:ln>
-            <a:solidFill>
-              <a:srgbClr val="000000"/>
-            </a:solidFill>
-          </a:ln>
-        </p:spPr>
-        <p:style>
-          <a:lnRef idx="2">
-            <a:schemeClr val="accent1">
-              <a:shade val="50000"/>
-            </a:schemeClr>
-          </a:lnRef>
-          <a:fillRef idx="1">
-            <a:schemeClr val="accent1"/>
-          </a:fillRef>
-          <a:effectRef idx="0">
-            <a:schemeClr val="accent1"/>
-          </a:effectRef>
-          <a:fontRef idx="minor"/>
-        </p:style>
-        <p:txBody>
-          <a:bodyPr rot="16200000" vert="vert270" lIns="45000" tIns="90000" rIns="45000" bIns="90000" anchor="ctr">
-            <a:noAutofit/>
-          </a:bodyPr>
-          <a:lstStyle/>
-          <a:p>
-            <a:pPr algn="ctr">
-              <a:lnSpc>
-                <a:spcPct val="100000"/>
-              </a:lnSpc>
-            </a:pPr>
-            <a:r>
-              <a:rPr lang="fr-FR" sz="1400" b="0" strike="noStrike" spc="-1">
-                <a:solidFill>
-                  <a:srgbClr val="000000"/>
-                </a:solidFill>
-                <a:latin typeface="Calibri"/>
-                <a:ea typeface="DejaVu Sans"/>
-              </a:rPr>
+          <p:cNvPr id="2" name="ZoneTexte 1">
+            <a:extLst>
+              <a:ext uri="{FF2B5EF4-FFF2-40B4-BE49-F238E27FC236}">
+                <a16:creationId xmlns:a16="http://schemas.microsoft.com/office/drawing/2014/main" id="{697108F9-AC64-7906-985C-C5A2251756F8}"/>
+              </a:ext>
+            </a:extLst>
+          </p:cNvPr>
+          <p:cNvSpPr txBox="1"/>
+          <p:nvPr/>
+        </p:nvSpPr>
+        <p:spPr>
+          <a:xfrm>
+            <a:off x="7580671" y="2153265"/>
+            <a:ext cx="2185214" cy="369332"/>
+          </a:xfrm>
+          <a:prstGeom prst="rect">
+            <a:avLst/>
+          </a:prstGeom>
+          <a:noFill/>
+        </p:spPr>
+        <p:txBody>
+          <a:bodyPr wrap="none" rtlCol="0">
+            <a:spAutoFit/>
+          </a:bodyPr>
+          <a:lstStyle/>
+          <a:p>
+            <a:r>
+              <a:rPr lang="fr-FR" dirty="0"/>
               <a:t>Réduction : 1 / 74,9</a:t>
             </a:r>
-            <a:endParaRPr lang="fr-FR" sz="1400" b="0" strike="noStrike" spc="-1">
-              <a:latin typeface="Arial"/>
-            </a:endParaRPr>
-          </a:p>
-        </p:txBody>
-      </p:sp>
-      <p:sp>
-        <p:nvSpPr>
-          <p:cNvPr id="120" name="CustomShape 6"/>
-          <p:cNvSpPr/>
-          <p:nvPr/>
-        </p:nvSpPr>
-        <p:spPr>
-          <a:xfrm rot="5400000">
-            <a:off x="8161560" y="873000"/>
-            <a:ext cx="385920" cy="3788640"/>
-          </a:xfrm>
-          <a:prstGeom prst="roundRect">
-            <a:avLst>
-              <a:gd name="adj" fmla="val 16667"/>
-            </a:avLst>
-          </a:prstGeom>
-          <a:solidFill>
-            <a:schemeClr val="bg1"/>
-          </a:solidFill>
-          <a:ln>
-            <a:solidFill>
-              <a:srgbClr val="000000"/>
-            </a:solidFill>
-          </a:ln>
-        </p:spPr>
-        <p:style>
-          <a:lnRef idx="2">
-            <a:schemeClr val="accent1">
-              <a:shade val="50000"/>
-            </a:schemeClr>
-          </a:lnRef>
-          <a:fillRef idx="1">
-            <a:schemeClr val="accent1"/>
-          </a:fillRef>
-          <a:effectRef idx="0">
-            <a:schemeClr val="accent1"/>
-          </a:effectRef>
-          <a:fontRef idx="minor"/>
-        </p:style>
-        <p:txBody>
-          <a:bodyPr rot="16200000" vert="vert270" lIns="45000" tIns="90000" rIns="45000" bIns="90000" anchor="ctr">
-            <a:noAutofit/>
-          </a:bodyPr>
-          <a:lstStyle/>
-          <a:p>
-            <a:pPr algn="ctr">
-              <a:lnSpc>
-                <a:spcPct val="100000"/>
-              </a:lnSpc>
-            </a:pPr>
-            <a:r>
-              <a:rPr lang="fr-FR" sz="1400" b="0" strike="noStrike" spc="-1">
-                <a:solidFill>
-                  <a:srgbClr val="000000"/>
-                </a:solidFill>
-                <a:latin typeface="Calibri"/>
-                <a:ea typeface="DejaVu Sans"/>
-              </a:rPr>
+          </a:p>
+        </p:txBody>
+      </p:sp>
+      <p:sp>
+        <p:nvSpPr>
+          <p:cNvPr id="3" name="ZoneTexte 2">
+            <a:extLst>
+              <a:ext uri="{FF2B5EF4-FFF2-40B4-BE49-F238E27FC236}">
+                <a16:creationId xmlns:a16="http://schemas.microsoft.com/office/drawing/2014/main" id="{B6B5B0E1-3D96-B15C-D6D9-20124B684286}"/>
+              </a:ext>
+            </a:extLst>
+          </p:cNvPr>
+          <p:cNvSpPr txBox="1"/>
+          <p:nvPr/>
+        </p:nvSpPr>
+        <p:spPr>
+          <a:xfrm>
+            <a:off x="7608955" y="2769671"/>
+            <a:ext cx="2069797" cy="369332"/>
+          </a:xfrm>
+          <a:prstGeom prst="rect">
+            <a:avLst/>
+          </a:prstGeom>
+          <a:noFill/>
+        </p:spPr>
+        <p:txBody>
+          <a:bodyPr wrap="none" rtlCol="0">
+            <a:spAutoFit/>
+          </a:bodyPr>
+          <a:lstStyle/>
+          <a:p>
+            <a:r>
+              <a:rPr lang="fr-FR" dirty="0"/>
               <a:t>Codeur : 360 CPR</a:t>
             </a:r>
-            <a:endParaRPr lang="fr-FR" sz="1400" b="0" strike="noStrike" spc="-1">
-              <a:latin typeface="Arial"/>
-            </a:endParaRPr>
           </a:p>
         </p:txBody>
       </p:sp>
@@ -7463,14 +7327,6 @@
   <p:clrMapOvr>
     <a:masterClrMapping/>
   </p:clrMapOvr>
-  <mc:AlternateContent xmlns:mc="http://schemas.openxmlformats.org/markup-compatibility/2006" xmlns:p14="http://schemas.microsoft.com/office/powerpoint/2010/main">
-    <mc:Choice Requires="p14">
-      <p:transition spd="slow" p14:dur="2000"/>
-    </mc:Choice>
-    <mc:Fallback xmlns="" xmlns:p15="http://schemas.microsoft.com/office/powerpoint/2012/main">
-      <p:transition spd="slow"/>
-    </mc:Fallback>
-  </mc:AlternateContent>
 </p:sld>
 </file>
 
@@ -7493,6 +7349,238 @@
       </p:grpSpPr>
       <p:sp>
         <p:nvSpPr>
+          <p:cNvPr id="12" name="CustomShape 9">
+            <a:extLst>
+              <a:ext uri="{FF2B5EF4-FFF2-40B4-BE49-F238E27FC236}">
+                <a16:creationId xmlns:a16="http://schemas.microsoft.com/office/drawing/2014/main" id="{42399554-8515-8A37-2F65-EB4410FCBD5F}"/>
+              </a:ext>
+            </a:extLst>
+          </p:cNvPr>
+          <p:cNvSpPr/>
+          <p:nvPr/>
+        </p:nvSpPr>
+        <p:spPr>
+          <a:xfrm>
+            <a:off x="10160308" y="1654200"/>
+            <a:ext cx="771480" cy="1411920"/>
+          </a:xfrm>
+          <a:prstGeom prst="roundRect">
+            <a:avLst>
+              <a:gd name="adj" fmla="val 16667"/>
+            </a:avLst>
+          </a:prstGeom>
+          <a:solidFill>
+            <a:schemeClr val="accent5">
+              <a:lumMod val="20000"/>
+              <a:lumOff val="80000"/>
+            </a:schemeClr>
+          </a:solidFill>
+          <a:ln>
+            <a:solidFill>
+              <a:srgbClr val="325490"/>
+            </a:solidFill>
+          </a:ln>
+        </p:spPr>
+        <p:style>
+          <a:lnRef idx="2">
+            <a:schemeClr val="accent1">
+              <a:shade val="50000"/>
+            </a:schemeClr>
+          </a:lnRef>
+          <a:fillRef idx="1">
+            <a:schemeClr val="accent1"/>
+          </a:fillRef>
+          <a:effectRef idx="0">
+            <a:schemeClr val="accent1"/>
+          </a:effectRef>
+          <a:fontRef idx="minor"/>
+        </p:style>
+        <p:txBody>
+          <a:bodyPr rot="16200000" vert="horz" lIns="0" tIns="0" rIns="0" bIns="0" anchor="ctr">
+            <a:noAutofit/>
+          </a:bodyPr>
+          <a:lstStyle/>
+          <a:p>
+            <a:pPr algn="ctr">
+              <a:lnSpc>
+                <a:spcPct val="100000"/>
+              </a:lnSpc>
+            </a:pPr>
+            <a:r>
+              <a:rPr lang="fr-FR" sz="1400" b="0" strike="noStrike" spc="-1" dirty="0">
+                <a:solidFill>
+                  <a:srgbClr val="808080"/>
+                </a:solidFill>
+                <a:latin typeface="Calibri"/>
+                <a:ea typeface="DejaVu Sans"/>
+              </a:rPr>
+              <a:t>Moteur 1</a:t>
+            </a:r>
+            <a:endParaRPr lang="fr-FR" sz="1400" b="0" strike="noStrike" spc="-1" dirty="0">
+              <a:latin typeface="Arial"/>
+            </a:endParaRPr>
+          </a:p>
+        </p:txBody>
+      </p:sp>
+      <p:sp>
+        <p:nvSpPr>
+          <p:cNvPr id="11" name="CustomShape 1">
+            <a:extLst>
+              <a:ext uri="{FF2B5EF4-FFF2-40B4-BE49-F238E27FC236}">
+                <a16:creationId xmlns:a16="http://schemas.microsoft.com/office/drawing/2014/main" id="{E32C5D75-4403-A6CC-E7BC-12771D23FFF3}"/>
+              </a:ext>
+            </a:extLst>
+          </p:cNvPr>
+          <p:cNvSpPr/>
+          <p:nvPr/>
+        </p:nvSpPr>
+        <p:spPr>
+          <a:xfrm>
+            <a:off x="6744600" y="1623060"/>
+            <a:ext cx="921960" cy="3825360"/>
+          </a:xfrm>
+          <a:prstGeom prst="roundRect">
+            <a:avLst>
+              <a:gd name="adj" fmla="val 16667"/>
+            </a:avLst>
+          </a:prstGeom>
+          <a:solidFill>
+            <a:schemeClr val="bg2"/>
+          </a:solidFill>
+          <a:ln>
+            <a:solidFill>
+              <a:srgbClr val="325490"/>
+            </a:solidFill>
+          </a:ln>
+        </p:spPr>
+        <p:style>
+          <a:lnRef idx="2">
+            <a:schemeClr val="accent1">
+              <a:shade val="50000"/>
+            </a:schemeClr>
+          </a:lnRef>
+          <a:fillRef idx="1">
+            <a:schemeClr val="accent1"/>
+          </a:fillRef>
+          <a:effectRef idx="0">
+            <a:schemeClr val="accent1"/>
+          </a:effectRef>
+          <a:fontRef idx="minor"/>
+        </p:style>
+        <p:txBody>
+          <a:bodyPr rot="16200000" vert="horz" wrap="none" lIns="0" tIns="0" rIns="0" bIns="0" anchor="ctr">
+            <a:noAutofit/>
+          </a:bodyPr>
+          <a:lstStyle/>
+          <a:p>
+            <a:pPr algn="ctr">
+              <a:lnSpc>
+                <a:spcPct val="100000"/>
+              </a:lnSpc>
+            </a:pPr>
+            <a:r>
+              <a:rPr lang="fr-FR" sz="2400" b="0" strike="noStrike" spc="-1" dirty="0">
+                <a:solidFill>
+                  <a:srgbClr val="808080"/>
+                </a:solidFill>
+                <a:latin typeface="Calibri"/>
+                <a:ea typeface="DejaVu Sans"/>
+              </a:rPr>
+              <a:t>Nucléo </a:t>
+            </a:r>
+            <a:r>
+              <a:rPr lang="fr-FR" sz="2400" b="0" strike="noStrike" spc="-1" dirty="0" err="1">
+                <a:solidFill>
+                  <a:srgbClr val="808080"/>
+                </a:solidFill>
+                <a:latin typeface="Calibri"/>
+                <a:ea typeface="DejaVu Sans"/>
+              </a:rPr>
+              <a:t>Board</a:t>
+            </a:r>
+            <a:endParaRPr lang="fr-FR" sz="2400" b="0" strike="noStrike" spc="-1" dirty="0">
+              <a:latin typeface="Arial"/>
+            </a:endParaRPr>
+          </a:p>
+        </p:txBody>
+      </p:sp>
+      <p:sp>
+        <p:nvSpPr>
+          <p:cNvPr id="4" name="CustomShape 9">
+            <a:extLst>
+              <a:ext uri="{FF2B5EF4-FFF2-40B4-BE49-F238E27FC236}">
+                <a16:creationId xmlns:a16="http://schemas.microsoft.com/office/drawing/2014/main" id="{E1A17FCB-D657-B087-EC67-18AB7979B1A8}"/>
+              </a:ext>
+            </a:extLst>
+          </p:cNvPr>
+          <p:cNvSpPr/>
+          <p:nvPr/>
+        </p:nvSpPr>
+        <p:spPr>
+          <a:xfrm>
+            <a:off x="3810960" y="3298010"/>
+            <a:ext cx="771480" cy="1411920"/>
+          </a:xfrm>
+          <a:prstGeom prst="roundRect">
+            <a:avLst>
+              <a:gd name="adj" fmla="val 16667"/>
+            </a:avLst>
+          </a:prstGeom>
+          <a:solidFill>
+            <a:schemeClr val="accent5">
+              <a:lumMod val="20000"/>
+              <a:lumOff val="80000"/>
+            </a:schemeClr>
+          </a:solidFill>
+          <a:ln>
+            <a:solidFill>
+              <a:srgbClr val="325490"/>
+            </a:solidFill>
+          </a:ln>
+        </p:spPr>
+        <p:style>
+          <a:lnRef idx="2">
+            <a:schemeClr val="accent1">
+              <a:shade val="50000"/>
+            </a:schemeClr>
+          </a:lnRef>
+          <a:fillRef idx="1">
+            <a:schemeClr val="accent1"/>
+          </a:fillRef>
+          <a:effectRef idx="0">
+            <a:schemeClr val="accent1"/>
+          </a:effectRef>
+          <a:fontRef idx="minor"/>
+        </p:style>
+        <p:txBody>
+          <a:bodyPr rot="16200000" vert="horz" lIns="0" tIns="0" rIns="0" bIns="0" anchor="ctr">
+            <a:noAutofit/>
+          </a:bodyPr>
+          <a:lstStyle/>
+          <a:p>
+            <a:pPr algn="ctr">
+              <a:lnSpc>
+                <a:spcPct val="100000"/>
+              </a:lnSpc>
+            </a:pPr>
+            <a:r>
+              <a:rPr lang="fr-FR" sz="1400" b="0" strike="noStrike" spc="-1" dirty="0">
+                <a:solidFill>
+                  <a:srgbClr val="808080"/>
+                </a:solidFill>
+                <a:latin typeface="Calibri"/>
+                <a:ea typeface="DejaVu Sans"/>
+              </a:rPr>
+              <a:t>Moteur 3</a:t>
+            </a:r>
+            <a:endParaRPr lang="fr-FR" sz="1400" b="0" strike="noStrike" spc="-1" dirty="0">
+              <a:latin typeface="Arial"/>
+            </a:endParaRPr>
+          </a:p>
+        </p:txBody>
+      </p:sp>
+      <p:sp>
+        <p:nvSpPr>
           <p:cNvPr id="121" name="CustomShape 1"/>
           <p:cNvSpPr/>
           <p:nvPr/>
@@ -7531,27 +7619,37 @@
           <a:fontRef idx="minor"/>
         </p:style>
         <p:txBody>
-          <a:bodyPr rot="16200000" vert="vert270" lIns="45000" tIns="90000" rIns="45000" bIns="90000" anchor="ctr">
-            <a:noAutofit/>
-          </a:bodyPr>
-          <a:lstStyle/>
-          <a:p>
-            <a:pPr algn="ctr">
-              <a:lnSpc>
-                <a:spcPct val="100000"/>
-              </a:lnSpc>
-            </a:pPr>
-            <a:r>
-              <a:rPr lang="fr-FR" sz="2400" b="0" strike="noStrike" spc="-1">
+          <a:bodyPr rot="16200000" vert="horz" wrap="none" lIns="0" tIns="0" rIns="0" bIns="0" anchor="ctr">
+            <a:noAutofit/>
+          </a:bodyPr>
+          <a:lstStyle/>
+          <a:p>
+            <a:pPr algn="ctr">
+              <a:lnSpc>
+                <a:spcPct val="100000"/>
+              </a:lnSpc>
+            </a:pPr>
+            <a:r>
+              <a:rPr lang="fr-FR" sz="2400" b="0" strike="noStrike" spc="-1" dirty="0">
                 <a:solidFill>
                   <a:srgbClr val="808080"/>
                 </a:solidFill>
                 <a:latin typeface="Calibri"/>
                 <a:ea typeface="DejaVu Sans"/>
               </a:rPr>
-              <a:t>Nucleo Board</a:t>
-            </a:r>
-            <a:endParaRPr lang="fr-FR" sz="2400" b="0" strike="noStrike" spc="-1">
+              <a:t>Nucléo </a:t>
+            </a:r>
+            <a:r>
+              <a:rPr lang="fr-FR" sz="2400" b="0" strike="noStrike" spc="-1" dirty="0" err="1">
+                <a:solidFill>
+                  <a:srgbClr val="808080"/>
+                </a:solidFill>
+                <a:latin typeface="Calibri"/>
+                <a:ea typeface="DejaVu Sans"/>
+              </a:rPr>
+              <a:t>Board</a:t>
+            </a:r>
+            <a:endParaRPr lang="fr-FR" sz="2400" b="0" strike="noStrike" spc="-1" dirty="0">
               <a:latin typeface="Arial"/>
             </a:endParaRPr>
           </a:p>
@@ -7980,18 +8078,18 @@
           <a:fontRef idx="minor"/>
         </p:style>
         <p:txBody>
-          <a:bodyPr rot="16200000" vert="vert270" lIns="45000" tIns="90000" rIns="45000" bIns="90000" anchor="ctr">
-            <a:noAutofit/>
-          </a:bodyPr>
-          <a:lstStyle/>
-          <a:p>
-            <a:pPr algn="ctr">
-              <a:lnSpc>
-                <a:spcPct val="100000"/>
-              </a:lnSpc>
-            </a:pPr>
-            <a:r>
-              <a:rPr lang="fr-FR" sz="1800" b="0" strike="noStrike" spc="-1">
+          <a:bodyPr rot="16200000" vert="horz" lIns="0" tIns="0" rIns="0" bIns="0" anchor="ctr">
+            <a:noAutofit/>
+          </a:bodyPr>
+          <a:lstStyle/>
+          <a:p>
+            <a:pPr algn="ctr">
+              <a:lnSpc>
+                <a:spcPct val="100000"/>
+              </a:lnSpc>
+            </a:pPr>
+            <a:r>
+              <a:rPr lang="fr-FR" sz="1400" b="0" strike="noStrike" spc="-1">
                 <a:solidFill>
                   <a:srgbClr val="808080"/>
                 </a:solidFill>
@@ -7999,72 +8097,6 @@
                 <a:ea typeface="DejaVu Sans"/>
               </a:rPr>
               <a:t>Moteur 2</a:t>
-            </a:r>
-            <a:endParaRPr lang="fr-FR" sz="1800" b="0" strike="noStrike" spc="-1">
-              <a:latin typeface="Arial"/>
-            </a:endParaRPr>
-          </a:p>
-        </p:txBody>
-      </p:sp>
-      <p:sp>
-        <p:nvSpPr>
-          <p:cNvPr id="130" name="CustomShape 10"/>
-          <p:cNvSpPr/>
-          <p:nvPr/>
-        </p:nvSpPr>
-        <p:spPr>
-          <a:xfrm>
-            <a:off x="2240280" y="3296160"/>
-            <a:ext cx="183960" cy="568440"/>
-          </a:xfrm>
-          <a:prstGeom prst="roundRect">
-            <a:avLst>
-              <a:gd name="adj" fmla="val 16667"/>
-            </a:avLst>
-          </a:prstGeom>
-          <a:solidFill>
-            <a:schemeClr val="bg1"/>
-          </a:solidFill>
-          <a:ln>
-            <a:solidFill>
-              <a:srgbClr val="000000"/>
-            </a:solidFill>
-          </a:ln>
-        </p:spPr>
-        <p:style>
-          <a:lnRef idx="2">
-            <a:schemeClr val="accent1">
-              <a:shade val="50000"/>
-            </a:schemeClr>
-          </a:lnRef>
-          <a:fillRef idx="1">
-            <a:schemeClr val="accent1"/>
-          </a:fillRef>
-          <a:effectRef idx="0">
-            <a:schemeClr val="accent1"/>
-          </a:effectRef>
-          <a:fontRef idx="minor"/>
-        </p:style>
-        <p:txBody>
-          <a:bodyPr rot="16200000" vert="vert270" lIns="45000" tIns="90000" rIns="45000" bIns="90000" anchor="ctr">
-            <a:noAutofit/>
-          </a:bodyPr>
-          <a:lstStyle/>
-          <a:p>
-            <a:pPr algn="ctr">
-              <a:lnSpc>
-                <a:spcPct val="100000"/>
-              </a:lnSpc>
-            </a:pPr>
-            <a:r>
-              <a:rPr lang="fr-FR" sz="1400" b="0" strike="noStrike" spc="-1">
-                <a:solidFill>
-                  <a:srgbClr val="000000"/>
-                </a:solidFill>
-                <a:latin typeface="Calibri"/>
-                <a:ea typeface="DejaVu Sans"/>
-              </a:rPr>
-              <a:t>PWM</a:t>
             </a:r>
             <a:endParaRPr lang="fr-FR" sz="1400" b="0" strike="noStrike" spc="-1">
               <a:latin typeface="Arial"/>
@@ -8387,7 +8419,7 @@
               </a:lnSpc>
             </a:pPr>
             <a:r>
-              <a:rPr lang="fr-FR" sz="1100" b="0" strike="noStrike" spc="-1">
+              <a:rPr lang="fr-FR" sz="1100" b="0" strike="noStrike" spc="-1" dirty="0">
                 <a:solidFill>
                   <a:srgbClr val="FFFFFF"/>
                 </a:solidFill>
@@ -8396,7 +8428,7 @@
               </a:rPr>
               <a:t>M2 -</a:t>
             </a:r>
-            <a:endParaRPr lang="fr-FR" sz="1100" b="0" strike="noStrike" spc="-1">
+            <a:endParaRPr lang="fr-FR" sz="1100" b="0" strike="noStrike" spc="-1" dirty="0">
               <a:latin typeface="Arial"/>
             </a:endParaRPr>
           </a:p>
@@ -8470,75 +8502,6 @@
       </p:sp>
       <p:sp>
         <p:nvSpPr>
-          <p:cNvPr id="137" name="CustomShape 17"/>
-          <p:cNvSpPr/>
-          <p:nvPr/>
-        </p:nvSpPr>
-        <p:spPr>
-          <a:xfrm>
-            <a:off x="3839760" y="3324600"/>
-            <a:ext cx="771480" cy="1411920"/>
-          </a:xfrm>
-          <a:prstGeom prst="roundRect">
-            <a:avLst>
-              <a:gd name="adj" fmla="val 16667"/>
-            </a:avLst>
-          </a:prstGeom>
-          <a:solidFill>
-            <a:schemeClr val="accent5">
-              <a:lumMod val="20000"/>
-              <a:lumOff val="80000"/>
-            </a:schemeClr>
-          </a:solidFill>
-          <a:ln>
-            <a:solidFill>
-              <a:srgbClr val="325490"/>
-            </a:solidFill>
-          </a:ln>
-        </p:spPr>
-        <p:style>
-          <a:lnRef idx="2">
-            <a:schemeClr val="accent1">
-              <a:shade val="50000"/>
-            </a:schemeClr>
-          </a:lnRef>
-          <a:fillRef idx="1">
-            <a:schemeClr val="accent1"/>
-          </a:fillRef>
-          <a:effectRef idx="0">
-            <a:schemeClr val="accent1"/>
-          </a:effectRef>
-          <a:fontRef idx="minor"/>
-        </p:style>
-        <p:txBody>
-          <a:bodyPr rot="16200000" vert="vert270" lIns="45000" tIns="90000" rIns="45000" bIns="90000" anchor="ctr">
-            <a:noAutofit/>
-          </a:bodyPr>
-          <a:lstStyle/>
-          <a:p>
-            <a:pPr algn="ctr">
-              <a:lnSpc>
-                <a:spcPct val="100000"/>
-              </a:lnSpc>
-            </a:pPr>
-            <a:r>
-              <a:rPr lang="fr-FR" sz="1800" b="0" strike="noStrike" spc="-1">
-                <a:solidFill>
-                  <a:srgbClr val="808080"/>
-                </a:solidFill>
-                <a:latin typeface="Calibri"/>
-                <a:ea typeface="DejaVu Sans"/>
-              </a:rPr>
-              <a:t>Moteur 3</a:t>
-            </a:r>
-            <a:endParaRPr lang="fr-FR" sz="1800" b="0" strike="noStrike" spc="-1">
-              <a:latin typeface="Arial"/>
-            </a:endParaRPr>
-          </a:p>
-        </p:txBody>
-      </p:sp>
-      <p:sp>
-        <p:nvSpPr>
           <p:cNvPr id="138" name="CustomShape 18"/>
           <p:cNvSpPr/>
           <p:nvPr/>
@@ -9463,13 +9426,79 @@
       </p:sp>
       <p:sp>
         <p:nvSpPr>
-          <p:cNvPr id="152" name="CustomShape 32"/>
+          <p:cNvPr id="153" name="CustomShape 33"/>
+          <p:cNvSpPr/>
+          <p:nvPr/>
+        </p:nvSpPr>
+        <p:spPr>
+          <a:xfrm>
+            <a:off x="2154650" y="1587395"/>
+            <a:ext cx="295460" cy="533110"/>
+          </a:xfrm>
+          <a:prstGeom prst="roundRect">
+            <a:avLst>
+              <a:gd name="adj" fmla="val 16667"/>
+            </a:avLst>
+          </a:prstGeom>
+          <a:solidFill>
+            <a:schemeClr val="bg1"/>
+          </a:solidFill>
+          <a:ln>
+            <a:solidFill>
+              <a:srgbClr val="000000"/>
+            </a:solidFill>
+          </a:ln>
+        </p:spPr>
+        <p:style>
+          <a:lnRef idx="2">
+            <a:schemeClr val="accent1">
+              <a:shade val="50000"/>
+            </a:schemeClr>
+          </a:lnRef>
+          <a:fillRef idx="1">
+            <a:schemeClr val="accent1"/>
+          </a:fillRef>
+          <a:effectRef idx="0">
+            <a:schemeClr val="accent1"/>
+          </a:effectRef>
+          <a:fontRef idx="minor"/>
+        </p:style>
+        <p:txBody>
+          <a:bodyPr rot="16200000" vert="horz" lIns="0" tIns="0" rIns="0" bIns="0" anchor="ctr">
+            <a:noAutofit/>
+          </a:bodyPr>
+          <a:lstStyle/>
+          <a:p>
+            <a:pPr algn="ctr">
+              <a:lnSpc>
+                <a:spcPct val="100000"/>
+              </a:lnSpc>
+            </a:pPr>
+            <a:r>
+              <a:rPr lang="fr-FR" sz="900" b="0" strike="noStrike" spc="-1" dirty="0">
+                <a:solidFill>
+                  <a:srgbClr val="000000"/>
+                </a:solidFill>
+                <a:latin typeface="Calibri"/>
+                <a:ea typeface="DejaVu Sans"/>
+              </a:rPr>
+              <a:t>PWM</a:t>
+            </a:r>
+            <a:endParaRPr lang="fr-FR" sz="900" b="0" strike="noStrike" spc="-1" dirty="0">
+              <a:latin typeface="Arial"/>
+            </a:endParaRPr>
+          </a:p>
+        </p:txBody>
+      </p:sp>
+      <p:sp>
+        <p:nvSpPr>
+          <p:cNvPr id="154" name="CustomShape 34"/>
           <p:cNvSpPr/>
           <p:nvPr/>
         </p:nvSpPr>
         <p:spPr>
           <a:xfrm rot="5400000">
-            <a:off x="2529720" y="3290040"/>
+            <a:off x="2516520" y="1569660"/>
             <a:ext cx="562320" cy="568440"/>
           </a:xfrm>
           <a:prstGeom prst="roundRect">
@@ -9501,18 +9530,18 @@
           <a:fontRef idx="minor"/>
         </p:style>
         <p:txBody>
-          <a:bodyPr rot="16200000" vert="vert270" lIns="45000" tIns="90000" rIns="45000" bIns="90000" anchor="ctr">
-            <a:noAutofit/>
-          </a:bodyPr>
-          <a:lstStyle/>
-          <a:p>
-            <a:pPr algn="ctr">
-              <a:lnSpc>
-                <a:spcPct val="100000"/>
-              </a:lnSpc>
-            </a:pPr>
-            <a:r>
-              <a:rPr lang="fr-FR" sz="1400" b="0" strike="noStrike" spc="-1">
+          <a:bodyPr rot="16200000" vert="horz" lIns="45000" tIns="90000" rIns="45000" bIns="90000" anchor="ctr">
+            <a:noAutofit/>
+          </a:bodyPr>
+          <a:lstStyle/>
+          <a:p>
+            <a:pPr algn="ctr">
+              <a:lnSpc>
+                <a:spcPct val="100000"/>
+              </a:lnSpc>
+            </a:pPr>
+            <a:r>
+              <a:rPr lang="fr-FR" sz="1200" b="0" strike="noStrike" spc="-1" dirty="0">
                 <a:solidFill>
                   <a:srgbClr val="000000"/>
                 </a:solidFill>
@@ -9521,406 +9550,7 @@
               </a:rPr>
               <a:t>Pont H</a:t>
             </a:r>
-            <a:endParaRPr lang="fr-FR" sz="1400" b="0" strike="noStrike" spc="-1">
-              <a:latin typeface="Arial"/>
-            </a:endParaRPr>
-          </a:p>
-        </p:txBody>
-      </p:sp>
-      <p:sp>
-        <p:nvSpPr>
-          <p:cNvPr id="153" name="CustomShape 33"/>
-          <p:cNvSpPr/>
-          <p:nvPr/>
-        </p:nvSpPr>
-        <p:spPr>
-          <a:xfrm>
-            <a:off x="2211840" y="1613520"/>
-            <a:ext cx="183960" cy="568440"/>
-          </a:xfrm>
-          <a:prstGeom prst="roundRect">
-            <a:avLst>
-              <a:gd name="adj" fmla="val 16667"/>
-            </a:avLst>
-          </a:prstGeom>
-          <a:solidFill>
-            <a:schemeClr val="bg1"/>
-          </a:solidFill>
-          <a:ln>
-            <a:solidFill>
-              <a:srgbClr val="000000"/>
-            </a:solidFill>
-          </a:ln>
-        </p:spPr>
-        <p:style>
-          <a:lnRef idx="2">
-            <a:schemeClr val="accent1">
-              <a:shade val="50000"/>
-            </a:schemeClr>
-          </a:lnRef>
-          <a:fillRef idx="1">
-            <a:schemeClr val="accent1"/>
-          </a:fillRef>
-          <a:effectRef idx="0">
-            <a:schemeClr val="accent1"/>
-          </a:effectRef>
-          <a:fontRef idx="minor"/>
-        </p:style>
-        <p:txBody>
-          <a:bodyPr rot="16200000" vert="vert270" lIns="45000" tIns="90000" rIns="45000" bIns="90000" anchor="ctr">
-            <a:noAutofit/>
-          </a:bodyPr>
-          <a:lstStyle/>
-          <a:p>
-            <a:pPr algn="ctr">
-              <a:lnSpc>
-                <a:spcPct val="100000"/>
-              </a:lnSpc>
-            </a:pPr>
-            <a:r>
-              <a:rPr lang="fr-FR" sz="1400" b="0" strike="noStrike" spc="-1">
-                <a:solidFill>
-                  <a:srgbClr val="000000"/>
-                </a:solidFill>
-                <a:latin typeface="Calibri"/>
-                <a:ea typeface="DejaVu Sans"/>
-              </a:rPr>
-              <a:t>PWM</a:t>
-            </a:r>
-            <a:endParaRPr lang="fr-FR" sz="1400" b="0" strike="noStrike" spc="-1">
-              <a:latin typeface="Arial"/>
-            </a:endParaRPr>
-          </a:p>
-        </p:txBody>
-      </p:sp>
-      <p:sp>
-        <p:nvSpPr>
-          <p:cNvPr id="154" name="CustomShape 34"/>
-          <p:cNvSpPr/>
-          <p:nvPr/>
-        </p:nvSpPr>
-        <p:spPr>
-          <a:xfrm rot="5400000">
-            <a:off x="2501280" y="1607760"/>
-            <a:ext cx="562320" cy="568440"/>
-          </a:xfrm>
-          <a:prstGeom prst="roundRect">
-            <a:avLst>
-              <a:gd name="adj" fmla="val 16667"/>
-            </a:avLst>
-          </a:prstGeom>
-          <a:solidFill>
-            <a:schemeClr val="bg1"/>
-          </a:solidFill>
-          <a:ln>
-            <a:solidFill>
-              <a:srgbClr val="000000"/>
-            </a:solidFill>
-          </a:ln>
-        </p:spPr>
-        <p:style>
-          <a:lnRef idx="2">
-            <a:schemeClr val="accent1">
-              <a:shade val="50000"/>
-            </a:schemeClr>
-          </a:lnRef>
-          <a:fillRef idx="1">
-            <a:schemeClr val="accent1"/>
-          </a:fillRef>
-          <a:effectRef idx="0">
-            <a:schemeClr val="accent1"/>
-          </a:effectRef>
-          <a:fontRef idx="minor"/>
-        </p:style>
-        <p:txBody>
-          <a:bodyPr rot="16200000" vert="vert270" lIns="45000" tIns="90000" rIns="45000" bIns="90000" anchor="ctr">
-            <a:noAutofit/>
-          </a:bodyPr>
-          <a:lstStyle/>
-          <a:p>
-            <a:pPr algn="ctr">
-              <a:lnSpc>
-                <a:spcPct val="100000"/>
-              </a:lnSpc>
-            </a:pPr>
-            <a:r>
-              <a:rPr lang="fr-FR" sz="1400" b="0" strike="noStrike" spc="-1">
-                <a:solidFill>
-                  <a:srgbClr val="000000"/>
-                </a:solidFill>
-                <a:latin typeface="Calibri"/>
-                <a:ea typeface="DejaVu Sans"/>
-              </a:rPr>
-              <a:t>Pont H</a:t>
-            </a:r>
-            <a:endParaRPr lang="fr-FR" sz="1400" b="0" strike="noStrike" spc="-1">
-              <a:latin typeface="Arial"/>
-            </a:endParaRPr>
-          </a:p>
-        </p:txBody>
-      </p:sp>
-      <p:sp>
-        <p:nvSpPr>
-          <p:cNvPr id="155" name="CustomShape 35"/>
-          <p:cNvSpPr/>
-          <p:nvPr/>
-        </p:nvSpPr>
-        <p:spPr>
-          <a:xfrm rot="5400000">
-            <a:off x="2449440" y="4076280"/>
-            <a:ext cx="385920" cy="771480"/>
-          </a:xfrm>
-          <a:prstGeom prst="roundRect">
-            <a:avLst>
-              <a:gd name="adj" fmla="val 16667"/>
-            </a:avLst>
-          </a:prstGeom>
-          <a:solidFill>
-            <a:schemeClr val="bg1"/>
-          </a:solidFill>
-          <a:ln>
-            <a:solidFill>
-              <a:srgbClr val="000000"/>
-            </a:solidFill>
-          </a:ln>
-        </p:spPr>
-        <p:style>
-          <a:lnRef idx="2">
-            <a:schemeClr val="accent1">
-              <a:shade val="50000"/>
-            </a:schemeClr>
-          </a:lnRef>
-          <a:fillRef idx="1">
-            <a:schemeClr val="accent1"/>
-          </a:fillRef>
-          <a:effectRef idx="0">
-            <a:schemeClr val="accent1"/>
-          </a:effectRef>
-          <a:fontRef idx="minor"/>
-        </p:style>
-        <p:txBody>
-          <a:bodyPr rot="16200000" vert="vert270" lIns="45000" tIns="90000" rIns="45000" bIns="90000" anchor="ctr">
-            <a:noAutofit/>
-          </a:bodyPr>
-          <a:lstStyle/>
-          <a:p>
-            <a:pPr algn="ctr">
-              <a:lnSpc>
-                <a:spcPct val="100000"/>
-              </a:lnSpc>
-            </a:pPr>
-            <a:r>
-              <a:rPr lang="fr-FR" sz="1400" b="0" strike="noStrike" spc="-1">
-                <a:solidFill>
-                  <a:srgbClr val="000000"/>
-                </a:solidFill>
-                <a:latin typeface="Calibri"/>
-                <a:ea typeface="DejaVu Sans"/>
-              </a:rPr>
-              <a:t>Codeur</a:t>
-            </a:r>
-            <a:endParaRPr lang="fr-FR" sz="1400" b="0" strike="noStrike" spc="-1">
-              <a:latin typeface="Arial"/>
-            </a:endParaRPr>
-          </a:p>
-        </p:txBody>
-      </p:sp>
-      <p:sp>
-        <p:nvSpPr>
-          <p:cNvPr id="156" name="CustomShape 36"/>
-          <p:cNvSpPr/>
-          <p:nvPr/>
-        </p:nvSpPr>
-        <p:spPr>
-          <a:xfrm rot="5400000">
-            <a:off x="2433600" y="2389680"/>
-            <a:ext cx="385920" cy="771480"/>
-          </a:xfrm>
-          <a:prstGeom prst="roundRect">
-            <a:avLst>
-              <a:gd name="adj" fmla="val 16667"/>
-            </a:avLst>
-          </a:prstGeom>
-          <a:solidFill>
-            <a:schemeClr val="bg1"/>
-          </a:solidFill>
-          <a:ln>
-            <a:solidFill>
-              <a:srgbClr val="000000"/>
-            </a:solidFill>
-          </a:ln>
-        </p:spPr>
-        <p:style>
-          <a:lnRef idx="2">
-            <a:schemeClr val="accent1">
-              <a:shade val="50000"/>
-            </a:schemeClr>
-          </a:lnRef>
-          <a:fillRef idx="1">
-            <a:schemeClr val="accent1"/>
-          </a:fillRef>
-          <a:effectRef idx="0">
-            <a:schemeClr val="accent1"/>
-          </a:effectRef>
-          <a:fontRef idx="minor"/>
-        </p:style>
-        <p:txBody>
-          <a:bodyPr rot="16200000" vert="vert270" lIns="45000" tIns="90000" rIns="45000" bIns="90000" anchor="ctr">
-            <a:noAutofit/>
-          </a:bodyPr>
-          <a:lstStyle/>
-          <a:p>
-            <a:pPr algn="ctr">
-              <a:lnSpc>
-                <a:spcPct val="100000"/>
-              </a:lnSpc>
-            </a:pPr>
-            <a:r>
-              <a:rPr lang="fr-FR" sz="1400" b="0" strike="noStrike" spc="-1">
-                <a:solidFill>
-                  <a:srgbClr val="000000"/>
-                </a:solidFill>
-                <a:latin typeface="Calibri"/>
-                <a:ea typeface="DejaVu Sans"/>
-              </a:rPr>
-              <a:t>Codeur</a:t>
-            </a:r>
-            <a:endParaRPr lang="fr-FR" sz="1400" b="0" strike="noStrike" spc="-1">
-              <a:latin typeface="Arial"/>
-            </a:endParaRPr>
-          </a:p>
-        </p:txBody>
-      </p:sp>
-      <p:sp>
-        <p:nvSpPr>
-          <p:cNvPr id="157" name="CustomShape 37"/>
-          <p:cNvSpPr/>
-          <p:nvPr/>
-        </p:nvSpPr>
-        <p:spPr>
-          <a:xfrm>
-            <a:off x="6771600" y="1603440"/>
-            <a:ext cx="921960" cy="3825360"/>
-          </a:xfrm>
-          <a:prstGeom prst="roundRect">
-            <a:avLst>
-              <a:gd name="adj" fmla="val 16667"/>
-            </a:avLst>
-          </a:prstGeom>
-          <a:solidFill>
-            <a:schemeClr val="bg2"/>
-          </a:solidFill>
-          <a:ln>
-            <a:solidFill>
-              <a:srgbClr val="325490"/>
-            </a:solidFill>
-          </a:ln>
-        </p:spPr>
-        <p:style>
-          <a:lnRef idx="2">
-            <a:schemeClr val="accent1">
-              <a:shade val="50000"/>
-            </a:schemeClr>
-          </a:lnRef>
-          <a:fillRef idx="1">
-            <a:schemeClr val="accent1"/>
-          </a:fillRef>
-          <a:effectRef idx="0">
-            <a:schemeClr val="accent1"/>
-          </a:effectRef>
-          <a:fontRef idx="minor"/>
-        </p:style>
-        <p:txBody>
-          <a:bodyPr rot="16200000" vert="vert270" lIns="45000" tIns="90000" rIns="45000" bIns="90000" anchor="ctr">
-            <a:noAutofit/>
-          </a:bodyPr>
-          <a:lstStyle/>
-          <a:p>
-            <a:pPr algn="ctr">
-              <a:lnSpc>
-                <a:spcPct val="100000"/>
-              </a:lnSpc>
-            </a:pPr>
-            <a:r>
-              <a:rPr lang="fr-FR" sz="2400" b="0" strike="noStrike" spc="-1">
-                <a:solidFill>
-                  <a:srgbClr val="808080"/>
-                </a:solidFill>
-                <a:latin typeface="Calibri"/>
-                <a:ea typeface="DejaVu Sans"/>
-              </a:rPr>
-              <a:t>Nucleo Board</a:t>
-            </a:r>
-            <a:endParaRPr lang="fr-FR" sz="2400" b="0" strike="noStrike" spc="-1">
-              <a:latin typeface="Arial"/>
-            </a:endParaRPr>
-          </a:p>
-        </p:txBody>
-      </p:sp>
-      <p:sp>
-        <p:nvSpPr>
-          <p:cNvPr id="158" name="CustomShape 38"/>
-          <p:cNvSpPr/>
-          <p:nvPr/>
-        </p:nvSpPr>
-        <p:spPr>
-          <a:xfrm>
-            <a:off x="10154160" y="1654200"/>
-            <a:ext cx="771480" cy="1411920"/>
-          </a:xfrm>
-          <a:prstGeom prst="roundRect">
-            <a:avLst>
-              <a:gd name="adj" fmla="val 16667"/>
-            </a:avLst>
-          </a:prstGeom>
-          <a:solidFill>
-            <a:schemeClr val="accent5">
-              <a:lumMod val="20000"/>
-              <a:lumOff val="80000"/>
-            </a:schemeClr>
-          </a:solidFill>
-          <a:ln>
-            <a:solidFill>
-              <a:srgbClr val="325490"/>
-            </a:solidFill>
-          </a:ln>
-        </p:spPr>
-        <p:style>
-          <a:lnRef idx="2">
-            <a:schemeClr val="accent1">
-              <a:shade val="50000"/>
-            </a:schemeClr>
-          </a:lnRef>
-          <a:fillRef idx="1">
-            <a:schemeClr val="accent1"/>
-          </a:fillRef>
-          <a:effectRef idx="0">
-            <a:schemeClr val="accent1"/>
-          </a:effectRef>
-          <a:fontRef idx="minor"/>
-        </p:style>
-        <p:txBody>
-          <a:bodyPr rot="16200000" vert="vert270" lIns="45000" tIns="90000" rIns="45000" bIns="90000" anchor="ctr">
-            <a:noAutofit/>
-          </a:bodyPr>
-          <a:lstStyle/>
-          <a:p>
-            <a:pPr algn="ctr">
-              <a:lnSpc>
-                <a:spcPct val="100000"/>
-              </a:lnSpc>
-            </a:pPr>
-            <a:r>
-              <a:rPr lang="fr-FR" sz="1800" b="0" strike="noStrike" spc="-1">
-                <a:solidFill>
-                  <a:srgbClr val="808080"/>
-                </a:solidFill>
-                <a:latin typeface="Calibri"/>
-                <a:ea typeface="DejaVu Sans"/>
-              </a:rPr>
-              <a:t>Moteur 1</a:t>
-            </a:r>
-            <a:endParaRPr lang="fr-FR" sz="1800" b="0" strike="noStrike" spc="-1">
+            <a:endParaRPr lang="fr-FR" sz="1200" b="0" strike="noStrike" spc="-1" dirty="0">
               <a:latin typeface="Arial"/>
             </a:endParaRPr>
           </a:p>
@@ -10583,204 +10213,6 @@
               <a:t>PB_0</a:t>
             </a:r>
             <a:endParaRPr lang="fr-FR" sz="900" b="0" strike="noStrike" spc="-1">
-              <a:latin typeface="Arial"/>
-            </a:endParaRPr>
-          </a:p>
-        </p:txBody>
-      </p:sp>
-      <p:sp>
-        <p:nvSpPr>
-          <p:cNvPr id="169" name="CustomShape 49"/>
-          <p:cNvSpPr/>
-          <p:nvPr/>
-        </p:nvSpPr>
-        <p:spPr>
-          <a:xfrm>
-            <a:off x="8555040" y="1613520"/>
-            <a:ext cx="183960" cy="568440"/>
-          </a:xfrm>
-          <a:prstGeom prst="roundRect">
-            <a:avLst>
-              <a:gd name="adj" fmla="val 16667"/>
-            </a:avLst>
-          </a:prstGeom>
-          <a:solidFill>
-            <a:schemeClr val="bg1"/>
-          </a:solidFill>
-          <a:ln>
-            <a:solidFill>
-              <a:srgbClr val="000000"/>
-            </a:solidFill>
-          </a:ln>
-        </p:spPr>
-        <p:style>
-          <a:lnRef idx="2">
-            <a:schemeClr val="accent1">
-              <a:shade val="50000"/>
-            </a:schemeClr>
-          </a:lnRef>
-          <a:fillRef idx="1">
-            <a:schemeClr val="accent1"/>
-          </a:fillRef>
-          <a:effectRef idx="0">
-            <a:schemeClr val="accent1"/>
-          </a:effectRef>
-          <a:fontRef idx="minor"/>
-        </p:style>
-        <p:txBody>
-          <a:bodyPr rot="16200000" vert="vert270" lIns="45000" tIns="90000" rIns="45000" bIns="90000" anchor="ctr">
-            <a:noAutofit/>
-          </a:bodyPr>
-          <a:lstStyle/>
-          <a:p>
-            <a:pPr algn="ctr">
-              <a:lnSpc>
-                <a:spcPct val="100000"/>
-              </a:lnSpc>
-            </a:pPr>
-            <a:r>
-              <a:rPr lang="fr-FR" sz="1400" b="0" strike="noStrike" spc="-1">
-                <a:solidFill>
-                  <a:srgbClr val="000000"/>
-                </a:solidFill>
-                <a:latin typeface="Calibri"/>
-                <a:ea typeface="DejaVu Sans"/>
-              </a:rPr>
-              <a:t>PWM</a:t>
-            </a:r>
-            <a:endParaRPr lang="fr-FR" sz="1400" b="0" strike="noStrike" spc="-1">
-              <a:latin typeface="Arial"/>
-            </a:endParaRPr>
-          </a:p>
-        </p:txBody>
-      </p:sp>
-      <p:sp>
-        <p:nvSpPr>
-          <p:cNvPr id="170" name="CustomShape 50"/>
-          <p:cNvSpPr/>
-          <p:nvPr/>
-        </p:nvSpPr>
-        <p:spPr>
-          <a:xfrm rot="5400000">
-            <a:off x="8844480" y="1607760"/>
-            <a:ext cx="562320" cy="568440"/>
-          </a:xfrm>
-          <a:prstGeom prst="roundRect">
-            <a:avLst>
-              <a:gd name="adj" fmla="val 16667"/>
-            </a:avLst>
-          </a:prstGeom>
-          <a:solidFill>
-            <a:schemeClr val="bg1"/>
-          </a:solidFill>
-          <a:ln>
-            <a:solidFill>
-              <a:srgbClr val="000000"/>
-            </a:solidFill>
-          </a:ln>
-        </p:spPr>
-        <p:style>
-          <a:lnRef idx="2">
-            <a:schemeClr val="accent1">
-              <a:shade val="50000"/>
-            </a:schemeClr>
-          </a:lnRef>
-          <a:fillRef idx="1">
-            <a:schemeClr val="accent1"/>
-          </a:fillRef>
-          <a:effectRef idx="0">
-            <a:schemeClr val="accent1"/>
-          </a:effectRef>
-          <a:fontRef idx="minor"/>
-        </p:style>
-        <p:txBody>
-          <a:bodyPr rot="16200000" vert="vert270" lIns="45000" tIns="90000" rIns="45000" bIns="90000" anchor="ctr">
-            <a:noAutofit/>
-          </a:bodyPr>
-          <a:lstStyle/>
-          <a:p>
-            <a:pPr algn="ctr">
-              <a:lnSpc>
-                <a:spcPct val="100000"/>
-              </a:lnSpc>
-            </a:pPr>
-            <a:r>
-              <a:rPr lang="fr-FR" sz="1400" b="0" strike="noStrike" spc="-1">
-                <a:solidFill>
-                  <a:srgbClr val="000000"/>
-                </a:solidFill>
-                <a:latin typeface="Calibri"/>
-                <a:ea typeface="DejaVu Sans"/>
-              </a:rPr>
-              <a:t>Pont H</a:t>
-            </a:r>
-            <a:endParaRPr lang="fr-FR" sz="1400" b="0" strike="noStrike" spc="-1">
-              <a:latin typeface="Arial"/>
-            </a:endParaRPr>
-          </a:p>
-        </p:txBody>
-      </p:sp>
-      <p:sp>
-        <p:nvSpPr>
-          <p:cNvPr id="171" name="CustomShape 51"/>
-          <p:cNvSpPr/>
-          <p:nvPr/>
-        </p:nvSpPr>
-        <p:spPr>
-          <a:xfrm rot="5400000">
-            <a:off x="8776800" y="2389680"/>
-            <a:ext cx="385920" cy="771480"/>
-          </a:xfrm>
-          <a:prstGeom prst="roundRect">
-            <a:avLst>
-              <a:gd name="adj" fmla="val 16667"/>
-            </a:avLst>
-          </a:prstGeom>
-          <a:solidFill>
-            <a:schemeClr val="bg1"/>
-          </a:solidFill>
-          <a:ln>
-            <a:solidFill>
-              <a:srgbClr val="000000"/>
-            </a:solidFill>
-          </a:ln>
-        </p:spPr>
-        <p:style>
-          <a:lnRef idx="2">
-            <a:schemeClr val="accent1">
-              <a:shade val="50000"/>
-            </a:schemeClr>
-          </a:lnRef>
-          <a:fillRef idx="1">
-            <a:schemeClr val="accent1"/>
-          </a:fillRef>
-          <a:effectRef idx="0">
-            <a:schemeClr val="accent1"/>
-          </a:effectRef>
-          <a:fontRef idx="minor"/>
-        </p:style>
-        <p:txBody>
-          <a:bodyPr rot="16200000" vert="vert270" lIns="45000" tIns="90000" rIns="45000" bIns="90000" anchor="ctr">
-            <a:noAutofit/>
-          </a:bodyPr>
-          <a:lstStyle/>
-          <a:p>
-            <a:pPr algn="ctr">
-              <a:lnSpc>
-                <a:spcPct val="100000"/>
-              </a:lnSpc>
-            </a:pPr>
-            <a:r>
-              <a:rPr lang="fr-FR" sz="1400" b="0" strike="noStrike" spc="-1">
-                <a:solidFill>
-                  <a:srgbClr val="000000"/>
-                </a:solidFill>
-                <a:latin typeface="Calibri"/>
-                <a:ea typeface="DejaVu Sans"/>
-              </a:rPr>
-              <a:t>Codeur</a:t>
-            </a:r>
-            <a:endParaRPr lang="fr-FR" sz="1400" b="0" strike="noStrike" spc="-1">
               <a:latin typeface="Arial"/>
             </a:endParaRPr>
           </a:p>
@@ -10949,8 +10381,8 @@
         </p:nvSpPr>
         <p:spPr>
           <a:xfrm rot="5400000">
-            <a:off x="2400480" y="4797720"/>
-            <a:ext cx="500040" cy="771480"/>
+            <a:off x="2298556" y="4765877"/>
+            <a:ext cx="685407" cy="771480"/>
           </a:xfrm>
           <a:prstGeom prst="roundRect">
             <a:avLst>
@@ -10981,18 +10413,18 @@
           <a:fontRef idx="minor"/>
         </p:style>
         <p:txBody>
-          <a:bodyPr rot="16200000" vert="vert270" lIns="45000" tIns="90000" rIns="45000" bIns="90000" anchor="ctr">
-            <a:noAutofit/>
-          </a:bodyPr>
-          <a:lstStyle/>
-          <a:p>
-            <a:pPr algn="ctr">
-              <a:lnSpc>
-                <a:spcPct val="100000"/>
-              </a:lnSpc>
-            </a:pPr>
-            <a:r>
-              <a:rPr lang="fr-FR" sz="1400" b="0" strike="noStrike" spc="-1">
+          <a:bodyPr rot="16200000" vert="horz" lIns="45000" tIns="90000" rIns="45000" bIns="90000" anchor="ctr">
+            <a:noAutofit/>
+          </a:bodyPr>
+          <a:lstStyle/>
+          <a:p>
+            <a:pPr algn="ctr">
+              <a:lnSpc>
+                <a:spcPct val="100000"/>
+              </a:lnSpc>
+            </a:pPr>
+            <a:r>
+              <a:rPr lang="fr-FR" sz="1200" b="0" strike="noStrike" spc="-1" dirty="0">
                 <a:solidFill>
                   <a:srgbClr val="000000"/>
                 </a:solidFill>
@@ -11001,12 +10433,11 @@
               </a:rPr>
               <a:t>Ponts H</a:t>
             </a:r>
-            <a:r>
-              <a:t/>
-            </a:r>
-            <a:br/>
-            <a:r>
-              <a:rPr lang="fr-FR" sz="1000" b="0" strike="noStrike" spc="-1">
+            <a:br>
+              <a:rPr sz="1600" dirty="0"/>
+            </a:br>
+            <a:r>
+              <a:rPr lang="fr-FR" sz="1000" b="0" strike="noStrike" spc="-1" dirty="0">
                 <a:solidFill>
                   <a:srgbClr val="000000"/>
                 </a:solidFill>
@@ -11015,7 +10446,511 @@
               </a:rPr>
               <a:t>(tous les moteurs)</a:t>
             </a:r>
-            <a:endParaRPr lang="fr-FR" sz="1000" b="0" strike="noStrike" spc="-1">
+            <a:endParaRPr lang="fr-FR" sz="1000" b="0" strike="noStrike" spc="-1" dirty="0">
+              <a:latin typeface="Arial"/>
+            </a:endParaRPr>
+          </a:p>
+        </p:txBody>
+      </p:sp>
+      <p:sp>
+        <p:nvSpPr>
+          <p:cNvPr id="3" name="CustomShape 35">
+            <a:extLst>
+              <a:ext uri="{FF2B5EF4-FFF2-40B4-BE49-F238E27FC236}">
+                <a16:creationId xmlns:a16="http://schemas.microsoft.com/office/drawing/2014/main" id="{C0EA9D23-A008-D163-0326-DB114C69C36B}"/>
+              </a:ext>
+            </a:extLst>
+          </p:cNvPr>
+          <p:cNvSpPr/>
+          <p:nvPr/>
+        </p:nvSpPr>
+        <p:spPr>
+          <a:xfrm rot="5400000">
+            <a:off x="2429564" y="2394026"/>
+            <a:ext cx="398930" cy="777498"/>
+          </a:xfrm>
+          <a:prstGeom prst="roundRect">
+            <a:avLst>
+              <a:gd name="adj" fmla="val 16667"/>
+            </a:avLst>
+          </a:prstGeom>
+          <a:solidFill>
+            <a:schemeClr val="bg1"/>
+          </a:solidFill>
+          <a:ln>
+            <a:solidFill>
+              <a:srgbClr val="000000"/>
+            </a:solidFill>
+          </a:ln>
+        </p:spPr>
+        <p:style>
+          <a:lnRef idx="2">
+            <a:schemeClr val="accent1">
+              <a:shade val="50000"/>
+            </a:schemeClr>
+          </a:lnRef>
+          <a:fillRef idx="1">
+            <a:schemeClr val="accent1"/>
+          </a:fillRef>
+          <a:effectRef idx="0">
+            <a:schemeClr val="accent1"/>
+          </a:effectRef>
+          <a:fontRef idx="minor"/>
+        </p:style>
+        <p:txBody>
+          <a:bodyPr rot="16200000" vert="horz" lIns="0" tIns="0" rIns="0" bIns="0" anchor="ctr">
+            <a:noAutofit/>
+          </a:bodyPr>
+          <a:lstStyle/>
+          <a:p>
+            <a:pPr algn="ctr">
+              <a:lnSpc>
+                <a:spcPct val="100000"/>
+              </a:lnSpc>
+            </a:pPr>
+            <a:r>
+              <a:rPr lang="fr-FR" sz="900" b="0" strike="noStrike" spc="-1">
+                <a:solidFill>
+                  <a:srgbClr val="000000"/>
+                </a:solidFill>
+                <a:latin typeface="Calibri"/>
+                <a:ea typeface="DejaVu Sans"/>
+              </a:rPr>
+              <a:t>Codeur</a:t>
+            </a:r>
+            <a:endParaRPr lang="fr-FR" sz="900" b="0" strike="noStrike" spc="-1">
+              <a:latin typeface="Arial"/>
+            </a:endParaRPr>
+          </a:p>
+        </p:txBody>
+      </p:sp>
+      <p:sp>
+        <p:nvSpPr>
+          <p:cNvPr id="5" name="CustomShape 33">
+            <a:extLst>
+              <a:ext uri="{FF2B5EF4-FFF2-40B4-BE49-F238E27FC236}">
+                <a16:creationId xmlns:a16="http://schemas.microsoft.com/office/drawing/2014/main" id="{EA36B4B7-669A-1FC4-F0E0-BFAAB4998599}"/>
+              </a:ext>
+            </a:extLst>
+          </p:cNvPr>
+          <p:cNvSpPr/>
+          <p:nvPr/>
+        </p:nvSpPr>
+        <p:spPr>
+          <a:xfrm>
+            <a:off x="2173481" y="3306800"/>
+            <a:ext cx="295460" cy="533110"/>
+          </a:xfrm>
+          <a:prstGeom prst="roundRect">
+            <a:avLst>
+              <a:gd name="adj" fmla="val 16667"/>
+            </a:avLst>
+          </a:prstGeom>
+          <a:solidFill>
+            <a:schemeClr val="bg1"/>
+          </a:solidFill>
+          <a:ln>
+            <a:solidFill>
+              <a:srgbClr val="000000"/>
+            </a:solidFill>
+          </a:ln>
+        </p:spPr>
+        <p:style>
+          <a:lnRef idx="2">
+            <a:schemeClr val="accent1">
+              <a:shade val="50000"/>
+            </a:schemeClr>
+          </a:lnRef>
+          <a:fillRef idx="1">
+            <a:schemeClr val="accent1"/>
+          </a:fillRef>
+          <a:effectRef idx="0">
+            <a:schemeClr val="accent1"/>
+          </a:effectRef>
+          <a:fontRef idx="minor"/>
+        </p:style>
+        <p:txBody>
+          <a:bodyPr rot="16200000" vert="horz" lIns="0" tIns="0" rIns="0" bIns="0" anchor="ctr">
+            <a:noAutofit/>
+          </a:bodyPr>
+          <a:lstStyle/>
+          <a:p>
+            <a:pPr algn="ctr">
+              <a:lnSpc>
+                <a:spcPct val="100000"/>
+              </a:lnSpc>
+            </a:pPr>
+            <a:r>
+              <a:rPr lang="fr-FR" sz="900" b="0" strike="noStrike" spc="-1" dirty="0">
+                <a:solidFill>
+                  <a:srgbClr val="000000"/>
+                </a:solidFill>
+                <a:latin typeface="Calibri"/>
+                <a:ea typeface="DejaVu Sans"/>
+              </a:rPr>
+              <a:t>PWM</a:t>
+            </a:r>
+            <a:endParaRPr lang="fr-FR" sz="900" b="0" strike="noStrike" spc="-1" dirty="0">
+              <a:latin typeface="Arial"/>
+            </a:endParaRPr>
+          </a:p>
+        </p:txBody>
+      </p:sp>
+      <p:sp>
+        <p:nvSpPr>
+          <p:cNvPr id="6" name="CustomShape 34">
+            <a:extLst>
+              <a:ext uri="{FF2B5EF4-FFF2-40B4-BE49-F238E27FC236}">
+                <a16:creationId xmlns:a16="http://schemas.microsoft.com/office/drawing/2014/main" id="{873BFE43-9F04-329D-ACBE-26C2695D37B4}"/>
+              </a:ext>
+            </a:extLst>
+          </p:cNvPr>
+          <p:cNvSpPr/>
+          <p:nvPr/>
+        </p:nvSpPr>
+        <p:spPr>
+          <a:xfrm rot="5400000">
+            <a:off x="2535351" y="3289065"/>
+            <a:ext cx="562320" cy="568440"/>
+          </a:xfrm>
+          <a:prstGeom prst="roundRect">
+            <a:avLst>
+              <a:gd name="adj" fmla="val 16667"/>
+            </a:avLst>
+          </a:prstGeom>
+          <a:solidFill>
+            <a:schemeClr val="bg1"/>
+          </a:solidFill>
+          <a:ln>
+            <a:solidFill>
+              <a:srgbClr val="000000"/>
+            </a:solidFill>
+          </a:ln>
+        </p:spPr>
+        <p:style>
+          <a:lnRef idx="2">
+            <a:schemeClr val="accent1">
+              <a:shade val="50000"/>
+            </a:schemeClr>
+          </a:lnRef>
+          <a:fillRef idx="1">
+            <a:schemeClr val="accent1"/>
+          </a:fillRef>
+          <a:effectRef idx="0">
+            <a:schemeClr val="accent1"/>
+          </a:effectRef>
+          <a:fontRef idx="minor"/>
+        </p:style>
+        <p:txBody>
+          <a:bodyPr rot="16200000" vert="horz" lIns="45000" tIns="90000" rIns="45000" bIns="90000" anchor="ctr">
+            <a:noAutofit/>
+          </a:bodyPr>
+          <a:lstStyle/>
+          <a:p>
+            <a:pPr algn="ctr">
+              <a:lnSpc>
+                <a:spcPct val="100000"/>
+              </a:lnSpc>
+            </a:pPr>
+            <a:r>
+              <a:rPr lang="fr-FR" sz="1200" b="0" strike="noStrike" spc="-1" dirty="0">
+                <a:solidFill>
+                  <a:srgbClr val="000000"/>
+                </a:solidFill>
+                <a:latin typeface="Calibri"/>
+                <a:ea typeface="DejaVu Sans"/>
+              </a:rPr>
+              <a:t>Pont H</a:t>
+            </a:r>
+            <a:endParaRPr lang="fr-FR" sz="1200" b="0" strike="noStrike" spc="-1" dirty="0">
+              <a:latin typeface="Arial"/>
+            </a:endParaRPr>
+          </a:p>
+        </p:txBody>
+      </p:sp>
+      <p:sp>
+        <p:nvSpPr>
+          <p:cNvPr id="7" name="CustomShape 35">
+            <a:extLst>
+              <a:ext uri="{FF2B5EF4-FFF2-40B4-BE49-F238E27FC236}">
+                <a16:creationId xmlns:a16="http://schemas.microsoft.com/office/drawing/2014/main" id="{E49D8C20-B1D5-9497-135A-63FCA1E4E609}"/>
+              </a:ext>
+            </a:extLst>
+          </p:cNvPr>
+          <p:cNvSpPr/>
+          <p:nvPr/>
+        </p:nvSpPr>
+        <p:spPr>
+          <a:xfrm rot="5400000">
+            <a:off x="2440775" y="4082951"/>
+            <a:ext cx="398930" cy="777498"/>
+          </a:xfrm>
+          <a:prstGeom prst="roundRect">
+            <a:avLst>
+              <a:gd name="adj" fmla="val 16667"/>
+            </a:avLst>
+          </a:prstGeom>
+          <a:solidFill>
+            <a:schemeClr val="bg1"/>
+          </a:solidFill>
+          <a:ln>
+            <a:solidFill>
+              <a:srgbClr val="000000"/>
+            </a:solidFill>
+          </a:ln>
+        </p:spPr>
+        <p:style>
+          <a:lnRef idx="2">
+            <a:schemeClr val="accent1">
+              <a:shade val="50000"/>
+            </a:schemeClr>
+          </a:lnRef>
+          <a:fillRef idx="1">
+            <a:schemeClr val="accent1"/>
+          </a:fillRef>
+          <a:effectRef idx="0">
+            <a:schemeClr val="accent1"/>
+          </a:effectRef>
+          <a:fontRef idx="minor"/>
+        </p:style>
+        <p:txBody>
+          <a:bodyPr rot="16200000" vert="horz" lIns="0" tIns="0" rIns="0" bIns="0" anchor="ctr">
+            <a:noAutofit/>
+          </a:bodyPr>
+          <a:lstStyle/>
+          <a:p>
+            <a:pPr algn="ctr">
+              <a:lnSpc>
+                <a:spcPct val="100000"/>
+              </a:lnSpc>
+            </a:pPr>
+            <a:r>
+              <a:rPr lang="fr-FR" sz="900" b="0" strike="noStrike" spc="-1">
+                <a:solidFill>
+                  <a:srgbClr val="000000"/>
+                </a:solidFill>
+                <a:latin typeface="Calibri"/>
+                <a:ea typeface="DejaVu Sans"/>
+              </a:rPr>
+              <a:t>Codeur</a:t>
+            </a:r>
+            <a:endParaRPr lang="fr-FR" sz="900" b="0" strike="noStrike" spc="-1">
+              <a:latin typeface="Arial"/>
+            </a:endParaRPr>
+          </a:p>
+        </p:txBody>
+      </p:sp>
+      <p:sp>
+        <p:nvSpPr>
+          <p:cNvPr id="8" name="CustomShape 33">
+            <a:extLst>
+              <a:ext uri="{FF2B5EF4-FFF2-40B4-BE49-F238E27FC236}">
+                <a16:creationId xmlns:a16="http://schemas.microsoft.com/office/drawing/2014/main" id="{1AF868D4-9284-BA08-B037-CCF1E980B9BF}"/>
+              </a:ext>
+            </a:extLst>
+          </p:cNvPr>
+          <p:cNvSpPr/>
+          <p:nvPr/>
+        </p:nvSpPr>
+        <p:spPr>
+          <a:xfrm>
+            <a:off x="8502955" y="1618115"/>
+            <a:ext cx="295460" cy="533110"/>
+          </a:xfrm>
+          <a:prstGeom prst="roundRect">
+            <a:avLst>
+              <a:gd name="adj" fmla="val 16667"/>
+            </a:avLst>
+          </a:prstGeom>
+          <a:solidFill>
+            <a:schemeClr val="bg1"/>
+          </a:solidFill>
+          <a:ln>
+            <a:solidFill>
+              <a:srgbClr val="000000"/>
+            </a:solidFill>
+          </a:ln>
+        </p:spPr>
+        <p:style>
+          <a:lnRef idx="2">
+            <a:schemeClr val="accent1">
+              <a:shade val="50000"/>
+            </a:schemeClr>
+          </a:lnRef>
+          <a:fillRef idx="1">
+            <a:schemeClr val="accent1"/>
+          </a:fillRef>
+          <a:effectRef idx="0">
+            <a:schemeClr val="accent1"/>
+          </a:effectRef>
+          <a:fontRef idx="minor"/>
+        </p:style>
+        <p:txBody>
+          <a:bodyPr rot="16200000" vert="horz" lIns="0" tIns="0" rIns="0" bIns="0" anchor="ctr">
+            <a:noAutofit/>
+          </a:bodyPr>
+          <a:lstStyle/>
+          <a:p>
+            <a:pPr algn="ctr">
+              <a:lnSpc>
+                <a:spcPct val="100000"/>
+              </a:lnSpc>
+            </a:pPr>
+            <a:r>
+              <a:rPr lang="fr-FR" sz="900" b="0" strike="noStrike" spc="-1" dirty="0">
+                <a:solidFill>
+                  <a:srgbClr val="000000"/>
+                </a:solidFill>
+                <a:latin typeface="Calibri"/>
+                <a:ea typeface="DejaVu Sans"/>
+              </a:rPr>
+              <a:t>PWM</a:t>
+            </a:r>
+            <a:endParaRPr lang="fr-FR" sz="900" b="0" strike="noStrike" spc="-1" dirty="0">
+              <a:latin typeface="Arial"/>
+            </a:endParaRPr>
+          </a:p>
+        </p:txBody>
+      </p:sp>
+      <p:sp>
+        <p:nvSpPr>
+          <p:cNvPr id="9" name="CustomShape 34">
+            <a:extLst>
+              <a:ext uri="{FF2B5EF4-FFF2-40B4-BE49-F238E27FC236}">
+                <a16:creationId xmlns:a16="http://schemas.microsoft.com/office/drawing/2014/main" id="{26592C5E-6094-5566-E9EC-CBB151037D38}"/>
+              </a:ext>
+            </a:extLst>
+          </p:cNvPr>
+          <p:cNvSpPr/>
+          <p:nvPr/>
+        </p:nvSpPr>
+        <p:spPr>
+          <a:xfrm rot="5400000">
+            <a:off x="8864825" y="1600380"/>
+            <a:ext cx="562320" cy="568440"/>
+          </a:xfrm>
+          <a:prstGeom prst="roundRect">
+            <a:avLst>
+              <a:gd name="adj" fmla="val 16667"/>
+            </a:avLst>
+          </a:prstGeom>
+          <a:solidFill>
+            <a:schemeClr val="bg1"/>
+          </a:solidFill>
+          <a:ln>
+            <a:solidFill>
+              <a:srgbClr val="000000"/>
+            </a:solidFill>
+          </a:ln>
+        </p:spPr>
+        <p:style>
+          <a:lnRef idx="2">
+            <a:schemeClr val="accent1">
+              <a:shade val="50000"/>
+            </a:schemeClr>
+          </a:lnRef>
+          <a:fillRef idx="1">
+            <a:schemeClr val="accent1"/>
+          </a:fillRef>
+          <a:effectRef idx="0">
+            <a:schemeClr val="accent1"/>
+          </a:effectRef>
+          <a:fontRef idx="minor"/>
+        </p:style>
+        <p:txBody>
+          <a:bodyPr rot="16200000" vert="horz" lIns="45000" tIns="90000" rIns="45000" bIns="90000" anchor="ctr">
+            <a:noAutofit/>
+          </a:bodyPr>
+          <a:lstStyle/>
+          <a:p>
+            <a:pPr algn="ctr">
+              <a:lnSpc>
+                <a:spcPct val="100000"/>
+              </a:lnSpc>
+            </a:pPr>
+            <a:r>
+              <a:rPr lang="fr-FR" sz="1200" b="0" strike="noStrike" spc="-1" dirty="0">
+                <a:solidFill>
+                  <a:srgbClr val="000000"/>
+                </a:solidFill>
+                <a:latin typeface="Calibri"/>
+                <a:ea typeface="DejaVu Sans"/>
+              </a:rPr>
+              <a:t>Pont H</a:t>
+            </a:r>
+            <a:endParaRPr lang="fr-FR" sz="1200" b="0" strike="noStrike" spc="-1" dirty="0">
+              <a:latin typeface="Arial"/>
+            </a:endParaRPr>
+          </a:p>
+        </p:txBody>
+      </p:sp>
+      <p:sp>
+        <p:nvSpPr>
+          <p:cNvPr id="10" name="CustomShape 35">
+            <a:extLst>
+              <a:ext uri="{FF2B5EF4-FFF2-40B4-BE49-F238E27FC236}">
+                <a16:creationId xmlns:a16="http://schemas.microsoft.com/office/drawing/2014/main" id="{9F99C773-E6D4-D4C5-086E-64F9D866D2B3}"/>
+              </a:ext>
+            </a:extLst>
+          </p:cNvPr>
+          <p:cNvSpPr/>
+          <p:nvPr/>
+        </p:nvSpPr>
+        <p:spPr>
+          <a:xfrm rot="5400000">
+            <a:off x="8777869" y="2424746"/>
+            <a:ext cx="398930" cy="777498"/>
+          </a:xfrm>
+          <a:prstGeom prst="roundRect">
+            <a:avLst>
+              <a:gd name="adj" fmla="val 16667"/>
+            </a:avLst>
+          </a:prstGeom>
+          <a:solidFill>
+            <a:schemeClr val="bg1"/>
+          </a:solidFill>
+          <a:ln>
+            <a:solidFill>
+              <a:srgbClr val="000000"/>
+            </a:solidFill>
+          </a:ln>
+        </p:spPr>
+        <p:style>
+          <a:lnRef idx="2">
+            <a:schemeClr val="accent1">
+              <a:shade val="50000"/>
+            </a:schemeClr>
+          </a:lnRef>
+          <a:fillRef idx="1">
+            <a:schemeClr val="accent1"/>
+          </a:fillRef>
+          <a:effectRef idx="0">
+            <a:schemeClr val="accent1"/>
+          </a:effectRef>
+          <a:fontRef idx="minor"/>
+        </p:style>
+        <p:txBody>
+          <a:bodyPr rot="16200000" vert="horz" lIns="0" tIns="0" rIns="0" bIns="0" anchor="ctr">
+            <a:noAutofit/>
+          </a:bodyPr>
+          <a:lstStyle/>
+          <a:p>
+            <a:pPr algn="ctr">
+              <a:lnSpc>
+                <a:spcPct val="100000"/>
+              </a:lnSpc>
+            </a:pPr>
+            <a:r>
+              <a:rPr lang="fr-FR" sz="900" b="0" strike="noStrike" spc="-1">
+                <a:solidFill>
+                  <a:srgbClr val="000000"/>
+                </a:solidFill>
+                <a:latin typeface="Calibri"/>
+                <a:ea typeface="DejaVu Sans"/>
+              </a:rPr>
+              <a:t>Codeur</a:t>
+            </a:r>
+            <a:endParaRPr lang="fr-FR" sz="900" b="0" strike="noStrike" spc="-1">
               <a:latin typeface="Arial"/>
             </a:endParaRPr>
           </a:p>
@@ -11026,14 +10961,6 @@
   <p:clrMapOvr>
     <a:masterClrMapping/>
   </p:clrMapOvr>
-  <mc:AlternateContent xmlns:mc="http://schemas.openxmlformats.org/markup-compatibility/2006" xmlns:p14="http://schemas.microsoft.com/office/powerpoint/2010/main">
-    <mc:Choice Requires="p14">
-      <p:transition spd="slow" p14:dur="2000"/>
-    </mc:Choice>
-    <mc:Fallback xmlns="" xmlns:p15="http://schemas.microsoft.com/office/powerpoint/2012/main">
-      <p:transition spd="slow"/>
-    </mc:Fallback>
-  </mc:AlternateContent>
 </p:sld>
 </file>
 
@@ -11094,7 +11021,7 @@
           <a:fontRef idx="minor"/>
         </p:style>
         <p:txBody>
-          <a:bodyPr rot="16200000" vert="vert270" lIns="45000" tIns="90000" rIns="45000" bIns="90000" anchor="ctr">
+          <a:bodyPr rot="16200000" vert="horz" wrap="none" lIns="45000" tIns="90000" rIns="45000" bIns="90000" anchor="ctr">
             <a:noAutofit/>
           </a:bodyPr>
           <a:lstStyle/>
@@ -13816,18 +13743,18 @@
           <a:fontRef idx="minor"/>
         </p:style>
         <p:txBody>
-          <a:bodyPr rot="16200000" vert="vert270" lIns="45000" tIns="90000" rIns="45000" bIns="90000" anchor="ctr">
-            <a:noAutofit/>
-          </a:bodyPr>
-          <a:lstStyle/>
-          <a:p>
-            <a:pPr algn="ctr">
-              <a:lnSpc>
-                <a:spcPct val="100000"/>
-              </a:lnSpc>
-            </a:pPr>
-            <a:r>
-              <a:rPr lang="fr-FR" sz="2400" b="0" strike="noStrike" spc="-1">
+          <a:bodyPr rot="16200000" vert="horz" wrap="none" lIns="45000" tIns="90000" rIns="45000" bIns="90000" anchor="ctr">
+            <a:noAutofit/>
+          </a:bodyPr>
+          <a:lstStyle/>
+          <a:p>
+            <a:pPr algn="ctr">
+              <a:lnSpc>
+                <a:spcPct val="100000"/>
+              </a:lnSpc>
+            </a:pPr>
+            <a:r>
+              <a:rPr lang="fr-FR" sz="2400" b="0" strike="noStrike" spc="-1" dirty="0">
                 <a:solidFill>
                   <a:srgbClr val="808080"/>
                 </a:solidFill>
@@ -13836,7 +13763,7 @@
               </a:rPr>
               <a:t>Morpho Gauche / Nucléo</a:t>
             </a:r>
-            <a:endParaRPr lang="fr-FR" sz="2400" b="0" strike="noStrike" spc="-1">
+            <a:endParaRPr lang="fr-FR" sz="2400" b="0" strike="noStrike" spc="-1" dirty="0">
               <a:latin typeface="Arial"/>
             </a:endParaRPr>
           </a:p>
@@ -18383,14 +18310,6 @@
   <p:clrMapOvr>
     <a:masterClrMapping/>
   </p:clrMapOvr>
-  <mc:AlternateContent xmlns:mc="http://schemas.openxmlformats.org/markup-compatibility/2006" xmlns:p14="http://schemas.microsoft.com/office/powerpoint/2010/main">
-    <mc:Choice Requires="p14">
-      <p:transition spd="slow" p14:dur="2000"/>
-    </mc:Choice>
-    <mc:Fallback xmlns="" xmlns:p15="http://schemas.microsoft.com/office/powerpoint/2012/main">
-      <p:transition spd="slow"/>
-    </mc:Fallback>
-  </mc:AlternateContent>
 </p:sld>
 </file>
 
@@ -18451,7 +18370,7 @@
           <a:fontRef idx="minor"/>
         </p:style>
         <p:txBody>
-          <a:bodyPr rot="16200000" vert="vert270" lIns="45000" tIns="90000" rIns="45000" bIns="90000" anchor="ctr">
+          <a:bodyPr rot="16200000" vert="horz" wrap="none" lIns="45000" tIns="90000" rIns="45000" bIns="90000" anchor="ctr">
             <a:noAutofit/>
           </a:bodyPr>
           <a:lstStyle/>
@@ -19087,18 +19006,18 @@
           <a:fontRef idx="minor"/>
         </p:style>
         <p:txBody>
-          <a:bodyPr rot="16200000" vert="vert270" lIns="45000" tIns="90000" rIns="45000" bIns="90000" anchor="ctr">
-            <a:noAutofit/>
-          </a:bodyPr>
-          <a:lstStyle/>
-          <a:p>
-            <a:pPr algn="ctr">
-              <a:lnSpc>
-                <a:spcPct val="100000"/>
-              </a:lnSpc>
-            </a:pPr>
-            <a:r>
-              <a:rPr lang="fr-FR" sz="1800" b="0" strike="noStrike" spc="-1">
+          <a:bodyPr rot="16200000" vert="horz" wrap="none" lIns="45000" tIns="90000" rIns="45000" bIns="90000" anchor="ctr">
+            <a:noAutofit/>
+          </a:bodyPr>
+          <a:lstStyle/>
+          <a:p>
+            <a:pPr algn="ctr">
+              <a:lnSpc>
+                <a:spcPct val="100000"/>
+              </a:lnSpc>
+            </a:pPr>
+            <a:r>
+              <a:rPr lang="fr-FR" sz="1800" b="0" strike="noStrike" spc="-1" dirty="0">
                 <a:solidFill>
                   <a:srgbClr val="808080"/>
                 </a:solidFill>
@@ -19107,7 +19026,7 @@
               </a:rPr>
               <a:t>nRF24L01 / RF</a:t>
             </a:r>
-            <a:endParaRPr lang="fr-FR" sz="1800" b="0" strike="noStrike" spc="-1">
+            <a:endParaRPr lang="fr-FR" sz="1800" b="0" strike="noStrike" spc="-1" dirty="0">
               <a:latin typeface="Arial"/>
             </a:endParaRPr>
           </a:p>
@@ -20065,14 +19984,6 @@
   <p:clrMapOvr>
     <a:masterClrMapping/>
   </p:clrMapOvr>
-  <mc:AlternateContent xmlns:mc="http://schemas.openxmlformats.org/markup-compatibility/2006" xmlns:p14="http://schemas.microsoft.com/office/powerpoint/2010/main">
-    <mc:Choice Requires="p14">
-      <p:transition spd="slow" p14:dur="2000"/>
-    </mc:Choice>
-    <mc:Fallback xmlns="" xmlns:p15="http://schemas.microsoft.com/office/powerpoint/2012/main">
-      <p:transition spd="slow"/>
-    </mc:Fallback>
-  </mc:AlternateContent>
 </p:sld>
 </file>
 

</xml_diff>